<commit_message>
project idea slides update V.3
</commit_message>
<xml_diff>
--- a/project idea slides.pptx
+++ b/project idea slides.pptx
@@ -113,7 +113,7 @@
   </p:defaultTextStyle>
   <p:extLst>
     <p:ext uri="{EFAFB233-063F-42B5-8137-9DF3F51BA10A}">
-      <p15:sldGuideLst xmlns:p15="http://schemas.microsoft.com/office/powerpoint/2012/main" xmlns="">
+      <p15:sldGuideLst xmlns="" xmlns:p15="http://schemas.microsoft.com/office/powerpoint/2012/main">
         <p15:guide id="1" orient="horz" pos="2160">
           <p15:clr>
             <a:srgbClr val="A4A3A4"/>
@@ -7171,7 +7171,7 @@
         <p:spPr>
           <a:xfrm>
             <a:off x="685800" y="1295400"/>
-            <a:ext cx="6347714" cy="3880773"/>
+            <a:ext cx="6347714" cy="5334000"/>
           </a:xfrm>
         </p:spPr>
         <p:txBody>
@@ -7264,13 +7264,64 @@
             </a:r>
             <a:r>
               <a:rPr lang="en-US" sz="2400" dirty="0" smtClean="0"/>
-              <a:t>List Button</a:t>
+              <a:t>List </a:t>
+            </a:r>
+            <a:r>
+              <a:rPr lang="en-US" sz="2400" dirty="0" smtClean="0"/>
+              <a:t>Button</a:t>
             </a:r>
           </a:p>
           <a:p>
             <a:pPr>
               <a:buFont typeface="Wingdings" pitchFamily="2" charset="2"/>
-              <a:buChar char="§"/>
+              <a:buChar char="q"/>
+            </a:pPr>
+            <a:r>
+              <a:rPr lang="en-US" sz="2400" dirty="0" smtClean="0"/>
+              <a:t>List of items  and shops</a:t>
+            </a:r>
+          </a:p>
+          <a:p>
+            <a:pPr>
+              <a:buFont typeface="Wingdings" pitchFamily="2" charset="2"/>
+              <a:buChar char="q"/>
+            </a:pPr>
+            <a:r>
+              <a:rPr lang="en-US" sz="2400" dirty="0" smtClean="0"/>
+              <a:t>Home screen</a:t>
+            </a:r>
+          </a:p>
+          <a:p>
+            <a:pPr>
+              <a:buFont typeface="Wingdings" pitchFamily="2" charset="2"/>
+              <a:buChar char="q"/>
+            </a:pPr>
+            <a:r>
+              <a:rPr lang="en-US" sz="2400" dirty="0" smtClean="0"/>
+              <a:t>Shop details (database) </a:t>
+            </a:r>
+          </a:p>
+          <a:p>
+            <a:pPr>
+              <a:buFont typeface="Wingdings" pitchFamily="2" charset="2"/>
+              <a:buChar char="q"/>
+            </a:pPr>
+            <a:r>
+              <a:rPr lang="en-US" sz="2400" dirty="0" smtClean="0"/>
+              <a:t>Map view </a:t>
+            </a:r>
+          </a:p>
+          <a:p>
+            <a:pPr>
+              <a:buFont typeface="Wingdings" pitchFamily="2" charset="2"/>
+              <a:buChar char="q"/>
+            </a:pPr>
+            <a:endParaRPr lang="en-US" sz="2400" dirty="0" smtClean="0"/>
+          </a:p>
+          <a:p>
+            <a:pPr>
+              <a:buFont typeface="Wingdings" pitchFamily="2" charset="2"/>
+              <a:buChar char="q"/>
             </a:pPr>
             <a:endParaRPr lang="en-US" sz="2400" dirty="0" smtClean="0"/>
           </a:p>
@@ -7330,7 +7381,12 @@
             <p:ph type="title"/>
           </p:nvPr>
         </p:nvSpPr>
-        <p:spPr/>
+        <p:spPr>
+          <a:xfrm>
+            <a:off x="609599" y="609600"/>
+            <a:ext cx="6347713" cy="3200400"/>
+          </a:xfrm>
+        </p:spPr>
         <p:txBody>
           <a:bodyPr>
             <a:normAutofit/>
@@ -7343,11 +7399,89 @@
                   <a:schemeClr val="tx1"/>
                 </a:solidFill>
               </a:rPr>
-              <a:t>Release Plan/ Milestone</a:t>
+              <a:t>Release </a:t>
+            </a:r>
+            <a:r>
+              <a:rPr lang="en-US" sz="2800" b="1" dirty="0" smtClean="0">
+                <a:solidFill>
+                  <a:schemeClr val="tx1"/>
+                </a:solidFill>
+              </a:rPr>
+              <a:t>Plan</a:t>
+            </a:r>
+            <a:r>
+              <a:rPr lang="en-US" sz="2800" b="1" dirty="0" smtClean="0">
+                <a:solidFill>
+                  <a:schemeClr val="tx1"/>
+                </a:solidFill>
+              </a:rPr>
+              <a:t>: </a:t>
+            </a:r>
+            <a:r>
+              <a:rPr lang="en-US" sz="2800" dirty="0">
+                <a:solidFill>
+                  <a:schemeClr val="accent2">
+                    <a:lumMod val="50000"/>
+                  </a:schemeClr>
+                </a:solidFill>
+              </a:rPr>
+              <a:t>Our system can search for any item that is listed by the </a:t>
+            </a:r>
+            <a:r>
+              <a:rPr lang="en-US" sz="2800" dirty="0" smtClean="0">
+                <a:solidFill>
+                  <a:schemeClr val="accent2">
+                    <a:lumMod val="50000"/>
+                  </a:schemeClr>
+                </a:solidFill>
+              </a:rPr>
+              <a:t>user. It </a:t>
+            </a:r>
+            <a:r>
+              <a:rPr lang="en-US" sz="2800" dirty="0">
+                <a:solidFill>
+                  <a:schemeClr val="accent2">
+                    <a:lumMod val="50000"/>
+                  </a:schemeClr>
+                </a:solidFill>
+              </a:rPr>
+              <a:t>provides the user with the name of the shops and on clicking on any of the shop user is directly directed to the map. From </a:t>
+            </a:r>
+            <a:r>
+              <a:rPr lang="en-US" sz="2800" dirty="0" smtClean="0">
+                <a:solidFill>
+                  <a:schemeClr val="accent2">
+                    <a:lumMod val="50000"/>
+                  </a:schemeClr>
+                </a:solidFill>
+              </a:rPr>
+              <a:t>this user </a:t>
+            </a:r>
+            <a:r>
+              <a:rPr lang="en-US" sz="2800" dirty="0">
+                <a:solidFill>
+                  <a:schemeClr val="accent2">
+                    <a:lumMod val="50000"/>
+                  </a:schemeClr>
+                </a:solidFill>
+              </a:rPr>
+              <a:t>gets a </a:t>
+            </a:r>
+            <a:r>
+              <a:rPr lang="en-US" sz="2800" dirty="0" smtClean="0">
+                <a:solidFill>
+                  <a:schemeClr val="accent2">
+                    <a:lumMod val="50000"/>
+                  </a:schemeClr>
+                </a:solidFill>
+              </a:rPr>
+              <a:t>clear direction of the chosen shop. </a:t>
             </a:r>
             <a:endParaRPr lang="en-US" sz="2800" b="1" dirty="0">
               <a:solidFill>
-                <a:schemeClr val="tx1"/>
+                <a:schemeClr val="accent2">
+                  <a:lumMod val="50000"/>
+                </a:schemeClr>
               </a:solidFill>
             </a:endParaRPr>
           </a:p>
@@ -7363,12 +7497,17 @@
             <p:ph idx="1"/>
           </p:nvPr>
         </p:nvSpPr>
-        <p:spPr/>
+        <p:spPr>
+          <a:xfrm>
+            <a:off x="3048000" y="4038600"/>
+            <a:ext cx="3325092" cy="2272865"/>
+          </a:xfrm>
+        </p:spPr>
         <p:txBody>
           <a:bodyPr/>
           <a:lstStyle/>
           <a:p>
-            <a:endParaRPr lang="en-US"/>
+            <a:endParaRPr lang="en-US" dirty="0"/>
           </a:p>
         </p:txBody>
       </p:sp>
@@ -7713,7 +7852,7 @@
   <a:extraClrSchemeLst/>
   <a:extLst>
     <a:ext uri="{05A4C25C-085E-4340-85A3-A5531E510DB2}">
-      <thm15:themeFamily xmlns:thm15="http://schemas.microsoft.com/office/thememl/2012/main" xmlns="" name="Facet" id="{C0C680CD-088A-49FC-A102-D699147F32B2}" vid="{CFBC31BA-B70F-4F30-BCAA-4F3011E16C4D}"/>
+      <thm15:themeFamily xmlns="" xmlns:thm15="http://schemas.microsoft.com/office/thememl/2012/main" name="Facet" id="{C0C680CD-088A-49FC-A102-D699147F32B2}" vid="{CFBC31BA-B70F-4F30-BCAA-4F3011E16C4D}"/>
     </a:ext>
   </a:extLst>
 </a:theme>

</xml_diff>

<commit_message>
Project idea slide updated V.04
last slide edited
</commit_message>
<xml_diff>
--- a/project idea slides.pptx
+++ b/project idea slides.pptx
@@ -113,7 +113,7 @@
   </p:defaultTextStyle>
   <p:extLst>
     <p:ext uri="{EFAFB233-063F-42B5-8137-9DF3F51BA10A}">
-      <p15:sldGuideLst xmlns="" xmlns:p15="http://schemas.microsoft.com/office/powerpoint/2012/main">
+      <p15:sldGuideLst xmlns:p15="http://schemas.microsoft.com/office/powerpoint/2012/main" xmlns="">
         <p15:guide id="1" orient="horz" pos="2160">
           <p15:clr>
             <a:srgbClr val="A4A3A4"/>
@@ -924,7 +924,7 @@
           <a:p>
             <a:fld id="{02C8990C-1A3E-4709-8A6E-645C4651D285}" type="datetimeFigureOut">
               <a:rPr lang="en-US" smtClean="0"/>
-              <a:t>2/10/2019</a:t>
+              <a:t>2/11/2019</a:t>
             </a:fld>
             <a:endParaRPr lang="en-US"/>
           </a:p>
@@ -1175,7 +1175,7 @@
           <a:p>
             <a:fld id="{02C8990C-1A3E-4709-8A6E-645C4651D285}" type="datetimeFigureOut">
               <a:rPr lang="en-US" smtClean="0"/>
-              <a:t>2/10/2019</a:t>
+              <a:t>2/11/2019</a:t>
             </a:fld>
             <a:endParaRPr lang="en-US"/>
           </a:p>
@@ -1489,7 +1489,7 @@
           <a:p>
             <a:fld id="{02C8990C-1A3E-4709-8A6E-645C4651D285}" type="datetimeFigureOut">
               <a:rPr lang="en-US" smtClean="0"/>
-              <a:t>2/10/2019</a:t>
+              <a:t>2/11/2019</a:t>
             </a:fld>
             <a:endParaRPr lang="en-US"/>
           </a:p>
@@ -1822,7 +1822,7 @@
           <a:p>
             <a:fld id="{02C8990C-1A3E-4709-8A6E-645C4651D285}" type="datetimeFigureOut">
               <a:rPr lang="en-US" smtClean="0"/>
-              <a:t>2/10/2019</a:t>
+              <a:t>2/11/2019</a:t>
             </a:fld>
             <a:endParaRPr lang="en-US"/>
           </a:p>
@@ -2136,7 +2136,7 @@
           <a:p>
             <a:fld id="{02C8990C-1A3E-4709-8A6E-645C4651D285}" type="datetimeFigureOut">
               <a:rPr lang="en-US" smtClean="0"/>
-              <a:t>2/10/2019</a:t>
+              <a:t>2/11/2019</a:t>
             </a:fld>
             <a:endParaRPr lang="en-US"/>
           </a:p>
@@ -2529,7 +2529,7 @@
           <a:p>
             <a:fld id="{02C8990C-1A3E-4709-8A6E-645C4651D285}" type="datetimeFigureOut">
               <a:rPr lang="en-US" smtClean="0"/>
-              <a:t>2/10/2019</a:t>
+              <a:t>2/11/2019</a:t>
             </a:fld>
             <a:endParaRPr lang="en-US"/>
           </a:p>
@@ -2699,7 +2699,7 @@
           <a:p>
             <a:fld id="{02C8990C-1A3E-4709-8A6E-645C4651D285}" type="datetimeFigureOut">
               <a:rPr lang="en-US" smtClean="0"/>
-              <a:t>2/10/2019</a:t>
+              <a:t>2/11/2019</a:t>
             </a:fld>
             <a:endParaRPr lang="en-US"/>
           </a:p>
@@ -2879,7 +2879,7 @@
           <a:p>
             <a:fld id="{02C8990C-1A3E-4709-8A6E-645C4651D285}" type="datetimeFigureOut">
               <a:rPr lang="en-US" smtClean="0"/>
-              <a:t>2/10/2019</a:t>
+              <a:t>2/11/2019</a:t>
             </a:fld>
             <a:endParaRPr lang="en-US"/>
           </a:p>
@@ -3031,7 +3031,7 @@
           <a:p>
             <a:fld id="{02C8990C-1A3E-4709-8A6E-645C4651D285}" type="datetimeFigureOut">
               <a:rPr lang="en-US" smtClean="0"/>
-              <a:t>2/10/2019</a:t>
+              <a:t>2/11/2019</a:t>
             </a:fld>
             <a:endParaRPr lang="en-US"/>
           </a:p>
@@ -3231,7 +3231,7 @@
           <a:p>
             <a:fld id="{02C8990C-1A3E-4709-8A6E-645C4651D285}" type="datetimeFigureOut">
               <a:rPr lang="en-US" smtClean="0"/>
-              <a:t>2/10/2019</a:t>
+              <a:t>2/11/2019</a:t>
             </a:fld>
             <a:endParaRPr lang="en-US"/>
           </a:p>
@@ -3478,7 +3478,7 @@
           <a:p>
             <a:fld id="{02C8990C-1A3E-4709-8A6E-645C4651D285}" type="datetimeFigureOut">
               <a:rPr lang="en-US" smtClean="0"/>
-              <a:t>2/10/2019</a:t>
+              <a:t>2/11/2019</a:t>
             </a:fld>
             <a:endParaRPr lang="en-US"/>
           </a:p>
@@ -3775,7 +3775,7 @@
           <a:p>
             <a:fld id="{02C8990C-1A3E-4709-8A6E-645C4651D285}" type="datetimeFigureOut">
               <a:rPr lang="en-US" smtClean="0"/>
-              <a:t>2/10/2019</a:t>
+              <a:t>2/11/2019</a:t>
             </a:fld>
             <a:endParaRPr lang="en-US"/>
           </a:p>
@@ -4154,7 +4154,7 @@
           <a:p>
             <a:fld id="{02C8990C-1A3E-4709-8A6E-645C4651D285}" type="datetimeFigureOut">
               <a:rPr lang="en-US" smtClean="0"/>
-              <a:t>2/10/2019</a:t>
+              <a:t>2/11/2019</a:t>
             </a:fld>
             <a:endParaRPr lang="en-US"/>
           </a:p>
@@ -4277,7 +4277,7 @@
           <a:p>
             <a:fld id="{02C8990C-1A3E-4709-8A6E-645C4651D285}" type="datetimeFigureOut">
               <a:rPr lang="en-US" smtClean="0"/>
-              <a:t>2/10/2019</a:t>
+              <a:t>2/11/2019</a:t>
             </a:fld>
             <a:endParaRPr lang="en-US"/>
           </a:p>
@@ -4372,7 +4372,7 @@
           <a:p>
             <a:fld id="{02C8990C-1A3E-4709-8A6E-645C4651D285}" type="datetimeFigureOut">
               <a:rPr lang="en-US" smtClean="0"/>
-              <a:t>2/10/2019</a:t>
+              <a:t>2/11/2019</a:t>
             </a:fld>
             <a:endParaRPr lang="en-US"/>
           </a:p>
@@ -4627,7 +4627,7 @@
           <a:p>
             <a:fld id="{02C8990C-1A3E-4709-8A6E-645C4651D285}" type="datetimeFigureOut">
               <a:rPr lang="en-US" smtClean="0"/>
-              <a:t>2/10/2019</a:t>
+              <a:t>2/11/2019</a:t>
             </a:fld>
             <a:endParaRPr lang="en-US"/>
           </a:p>
@@ -4890,7 +4890,7 @@
           <a:p>
             <a:fld id="{02C8990C-1A3E-4709-8A6E-645C4651D285}" type="datetimeFigureOut">
               <a:rPr lang="en-US" smtClean="0"/>
-              <a:t>2/10/2019</a:t>
+              <a:t>2/11/2019</a:t>
             </a:fld>
             <a:endParaRPr lang="en-US"/>
           </a:p>
@@ -5704,7 +5704,7 @@
           <a:p>
             <a:fld id="{02C8990C-1A3E-4709-8A6E-645C4651D285}" type="datetimeFigureOut">
               <a:rPr lang="en-US" smtClean="0"/>
-              <a:t>2/10/2019</a:t>
+              <a:t>2/11/2019</a:t>
             </a:fld>
             <a:endParaRPr lang="en-US"/>
           </a:p>
@@ -7264,11 +7264,7 @@
             </a:r>
             <a:r>
               <a:rPr lang="en-US" sz="2400" dirty="0" smtClean="0"/>
-              <a:t>List </a:t>
-            </a:r>
-            <a:r>
-              <a:rPr lang="en-US" sz="2400" dirty="0" smtClean="0"/>
-              <a:t>Button</a:t>
+              <a:t>List Button</a:t>
             </a:r>
           </a:p>
           <a:p>
@@ -7384,7 +7380,7 @@
         <p:spPr>
           <a:xfrm>
             <a:off x="609599" y="609600"/>
-            <a:ext cx="6347713" cy="3200400"/>
+            <a:ext cx="8077201" cy="5867400"/>
           </a:xfrm>
         </p:spPr>
         <p:txBody>
@@ -7399,23 +7395,7 @@
                   <a:schemeClr val="tx1"/>
                 </a:solidFill>
               </a:rPr>
-              <a:t>Release </a:t>
-            </a:r>
-            <a:r>
-              <a:rPr lang="en-US" sz="2800" b="1" dirty="0" smtClean="0">
-                <a:solidFill>
-                  <a:schemeClr val="tx1"/>
-                </a:solidFill>
-              </a:rPr>
-              <a:t>Plan</a:t>
-            </a:r>
-            <a:r>
-              <a:rPr lang="en-US" sz="2800" b="1" dirty="0" smtClean="0">
-                <a:solidFill>
-                  <a:schemeClr val="tx1"/>
-                </a:solidFill>
-              </a:rPr>
-              <a:t>: </a:t>
+              <a:t>Release Plan: </a:t>
             </a:r>
             <a:r>
               <a:rPr lang="en-US" sz="2800" dirty="0">
@@ -7476,6 +7456,77 @@
                 </a:solidFill>
               </a:rPr>
               <a:t>clear direction of the chosen shop. </a:t>
+            </a:r>
+            <a:r>
+              <a:rPr lang="en-US" sz="2800" dirty="0" smtClean="0">
+                <a:solidFill>
+                  <a:schemeClr val="accent2">
+                    <a:lumMod val="50000"/>
+                  </a:schemeClr>
+                </a:solidFill>
+              </a:rPr>
+              <a:t/>
+            </a:r>
+            <a:br>
+              <a:rPr lang="en-US" sz="2800" dirty="0" smtClean="0">
+                <a:solidFill>
+                  <a:schemeClr val="accent2">
+                    <a:lumMod val="50000"/>
+                  </a:schemeClr>
+                </a:solidFill>
+              </a:rPr>
+            </a:br>
+            <a:r>
+              <a:rPr lang="en-US" sz="2800" b="1" dirty="0">
+                <a:solidFill>
+                  <a:schemeClr val="tx1">
+                    <a:lumMod val="95000"/>
+                    <a:lumOff val="5000"/>
+                  </a:schemeClr>
+                </a:solidFill>
+              </a:rPr>
+              <a:t>Future </a:t>
+            </a:r>
+            <a:r>
+              <a:rPr lang="en-US" sz="2800" b="1" dirty="0" smtClean="0">
+                <a:solidFill>
+                  <a:schemeClr val="tx1">
+                    <a:lumMod val="95000"/>
+                    <a:lumOff val="5000"/>
+                  </a:schemeClr>
+                </a:solidFill>
+              </a:rPr>
+              <a:t>works: </a:t>
+            </a:r>
+            <a:r>
+              <a:rPr lang="en-US" sz="2800" dirty="0">
+                <a:solidFill>
+                  <a:schemeClr val="accent2">
+                    <a:lumMod val="50000"/>
+                  </a:schemeClr>
+                </a:solidFill>
+              </a:rPr>
+              <a:t>We have some more plans with our system. In future we plan to integrate customer feedback system. We also plan to integrate customer </a:t>
+            </a:r>
+            <a:r>
+              <a:rPr lang="en-US" sz="2800" dirty="0" smtClean="0">
+                <a:solidFill>
+                  <a:schemeClr val="accent2">
+                    <a:lumMod val="50000"/>
+                  </a:schemeClr>
+                </a:solidFill>
+              </a:rPr>
+              <a:t>behavior </a:t>
+            </a:r>
+            <a:r>
+              <a:rPr lang="en-US" sz="2800" dirty="0">
+                <a:solidFill>
+                  <a:schemeClr val="accent2">
+                    <a:lumMod val="50000"/>
+                  </a:schemeClr>
+                </a:solidFill>
+              </a:rPr>
+              <a:t>prediction pattern in our system. </a:t>
             </a:r>
             <a:endParaRPr lang="en-US" sz="2800" b="1" dirty="0">
               <a:solidFill>
@@ -7484,30 +7535,6 @@
                 </a:schemeClr>
               </a:solidFill>
             </a:endParaRPr>
-          </a:p>
-        </p:txBody>
-      </p:sp>
-      <p:sp>
-        <p:nvSpPr>
-          <p:cNvPr id="3" name="Content Placeholder 2"/>
-          <p:cNvSpPr>
-            <a:spLocks noGrp="1"/>
-          </p:cNvSpPr>
-          <p:nvPr>
-            <p:ph idx="1"/>
-          </p:nvPr>
-        </p:nvSpPr>
-        <p:spPr>
-          <a:xfrm>
-            <a:off x="3048000" y="4038600"/>
-            <a:ext cx="3325092" cy="2272865"/>
-          </a:xfrm>
-        </p:spPr>
-        <p:txBody>
-          <a:bodyPr/>
-          <a:lstStyle/>
-          <a:p>
-            <a:endParaRPr lang="en-US" dirty="0"/>
           </a:p>
         </p:txBody>
       </p:sp>
@@ -7852,7 +7879,7 @@
   <a:extraClrSchemeLst/>
   <a:extLst>
     <a:ext uri="{05A4C25C-085E-4340-85A3-A5531E510DB2}">
-      <thm15:themeFamily xmlns="" xmlns:thm15="http://schemas.microsoft.com/office/thememl/2012/main" name="Facet" id="{C0C680CD-088A-49FC-A102-D699147F32B2}" vid="{CFBC31BA-B70F-4F30-BCAA-4F3011E16C4D}"/>
+      <thm15:themeFamily xmlns:thm15="http://schemas.microsoft.com/office/thememl/2012/main" xmlns="" name="Facet" id="{C0C680CD-088A-49FC-A102-D699147F32B2}" vid="{CFBC31BA-B70F-4F30-BCAA-4F3011E16C4D}"/>
     </a:ext>
   </a:extLst>
 </a:theme>

</xml_diff>

<commit_message>
project idea slides updated V.05
LAst update file from me ( hope so) .....
</commit_message>
<xml_diff>
--- a/project idea slides.pptx
+++ b/project idea slides.pptx
@@ -12,7 +12,8 @@
     <p:sldId id="260" r:id="rId6"/>
     <p:sldId id="261" r:id="rId7"/>
     <p:sldId id="262" r:id="rId8"/>
-    <p:sldId id="263" r:id="rId9"/>
+    <p:sldId id="264" r:id="rId9"/>
+    <p:sldId id="263" r:id="rId10"/>
   </p:sldIdLst>
   <p:sldSz cx="9144000" cy="6858000" type="screen4x3"/>
   <p:notesSz cx="6858000" cy="9144000"/>
@@ -113,7 +114,7 @@
   </p:defaultTextStyle>
   <p:extLst>
     <p:ext uri="{EFAFB233-063F-42B5-8137-9DF3F51BA10A}">
-      <p15:sldGuideLst xmlns:p15="http://schemas.microsoft.com/office/powerpoint/2012/main" xmlns="">
+      <p15:sldGuideLst xmlns="" xmlns:p15="http://schemas.microsoft.com/office/powerpoint/2012/main">
         <p15:guide id="1" orient="horz" pos="2160">
           <p15:clr>
             <a:srgbClr val="A4A3A4"/>
@@ -7178,22 +7179,53 @@
           <a:bodyPr/>
           <a:lstStyle/>
           <a:p>
+            <a:pPr marL="0" indent="0">
+              <a:buNone/>
+            </a:pPr>
+            <a:endParaRPr lang="en-US" sz="2400" b="1" dirty="0" smtClean="0"/>
+          </a:p>
+          <a:p>
             <a:pPr>
               <a:buFont typeface="Wingdings" pitchFamily="2" charset="2"/>
               <a:buChar char="q"/>
             </a:pPr>
             <a:r>
-              <a:rPr lang="en-US" sz="2400" dirty="0" smtClean="0"/>
-              <a:t>GPS - </a:t>
-            </a:r>
-            <a:r>
-              <a:rPr lang="en-US" sz="2400" dirty="0"/>
-              <a:t>Global Positioning </a:t>
-            </a:r>
-            <a:r>
-              <a:rPr lang="en-US" sz="2400" dirty="0" smtClean="0"/>
-              <a:t>System</a:t>
-            </a:r>
+              <a:rPr lang="en-US" sz="2400" dirty="0">
+                <a:solidFill>
+                  <a:schemeClr val="accent2">
+                    <a:lumMod val="50000"/>
+                  </a:schemeClr>
+                </a:solidFill>
+              </a:rPr>
+              <a:t>Register or Log </a:t>
+            </a:r>
+            <a:r>
+              <a:rPr lang="en-US" sz="2400" dirty="0" smtClean="0">
+                <a:solidFill>
+                  <a:schemeClr val="accent2">
+                    <a:lumMod val="50000"/>
+                  </a:schemeClr>
+                </a:solidFill>
+              </a:rPr>
+              <a:t>In </a:t>
+            </a:r>
+            <a:r>
+              <a:rPr lang="en-US" sz="2400" dirty="0" smtClean="0">
+                <a:solidFill>
+                  <a:schemeClr val="accent2">
+                    <a:lumMod val="50000"/>
+                  </a:schemeClr>
+                </a:solidFill>
+              </a:rPr>
+              <a:t>Button (both Admin and User interface) </a:t>
+            </a:r>
+            <a:endParaRPr lang="en-US" sz="2400" dirty="0" smtClean="0">
+              <a:solidFill>
+                <a:schemeClr val="accent2">
+                  <a:lumMod val="50000"/>
+                </a:schemeClr>
+              </a:solidFill>
+            </a:endParaRPr>
           </a:p>
           <a:p>
             <a:pPr>
@@ -7201,12 +7233,24 @@
               <a:buChar char="q"/>
             </a:pPr>
             <a:r>
-              <a:rPr lang="en-US" sz="2400" dirty="0"/>
-              <a:t>Google </a:t>
-            </a:r>
-            <a:r>
-              <a:rPr lang="en-US" sz="2400" dirty="0" smtClean="0"/>
-              <a:t>Maps</a:t>
+              <a:rPr lang="en-US" sz="2400" dirty="0">
+                <a:solidFill>
+                  <a:schemeClr val="accent2">
+                    <a:lumMod val="50000"/>
+                  </a:schemeClr>
+                </a:solidFill>
+              </a:rPr>
+              <a:t>Create </a:t>
+            </a:r>
+            <a:r>
+              <a:rPr lang="en-US" sz="2400" dirty="0" smtClean="0">
+                <a:solidFill>
+                  <a:schemeClr val="accent2">
+                    <a:lumMod val="50000"/>
+                  </a:schemeClr>
+                </a:solidFill>
+              </a:rPr>
+              <a:t>List Button</a:t>
             </a:r>
           </a:p>
           <a:p>
@@ -7215,12 +7259,14 @@
               <a:buChar char="q"/>
             </a:pPr>
             <a:r>
-              <a:rPr lang="en-US" sz="2400" dirty="0"/>
-              <a:t>Google </a:t>
-            </a:r>
-            <a:r>
-              <a:rPr lang="en-US" sz="2400" dirty="0" smtClean="0"/>
-              <a:t>API</a:t>
+              <a:rPr lang="en-US" sz="2400" dirty="0" smtClean="0">
+                <a:solidFill>
+                  <a:schemeClr val="accent2">
+                    <a:lumMod val="50000"/>
+                  </a:schemeClr>
+                </a:solidFill>
+              </a:rPr>
+              <a:t>List of items  and shops</a:t>
             </a:r>
           </a:p>
           <a:p>
@@ -7228,15 +7274,15 @@
               <a:buFont typeface="Wingdings" pitchFamily="2" charset="2"/>
               <a:buChar char="q"/>
             </a:pPr>
-            <a:endParaRPr lang="en-US" dirty="0"/>
-          </a:p>
-          <a:p>
-            <a:pPr marL="0" indent="0">
-              <a:buNone/>
-            </a:pPr>
-            <a:r>
-              <a:rPr lang="en-US" sz="2400" b="1" dirty="0" smtClean="0"/>
-              <a:t>Our App will have </a:t>
+            <a:r>
+              <a:rPr lang="en-US" sz="2400" dirty="0" smtClean="0">
+                <a:solidFill>
+                  <a:schemeClr val="accent2">
+                    <a:lumMod val="50000"/>
+                  </a:schemeClr>
+                </a:solidFill>
+              </a:rPr>
+              <a:t>Home screen</a:t>
             </a:r>
           </a:p>
           <a:p>
@@ -7245,12 +7291,14 @@
               <a:buChar char="q"/>
             </a:pPr>
             <a:r>
-              <a:rPr lang="en-US" sz="2400" dirty="0"/>
-              <a:t>Register or Log </a:t>
-            </a:r>
-            <a:r>
-              <a:rPr lang="en-US" sz="2400" dirty="0" smtClean="0"/>
-              <a:t>In Button</a:t>
+              <a:rPr lang="en-US" sz="2400" dirty="0" smtClean="0">
+                <a:solidFill>
+                  <a:schemeClr val="accent2">
+                    <a:lumMod val="50000"/>
+                  </a:schemeClr>
+                </a:solidFill>
+              </a:rPr>
+              <a:t>Shop details (database) </a:t>
             </a:r>
           </a:p>
           <a:p>
@@ -7259,51 +7307,13 @@
               <a:buChar char="q"/>
             </a:pPr>
             <a:r>
-              <a:rPr lang="en-US" sz="2400" dirty="0"/>
-              <a:t>Create </a:t>
-            </a:r>
-            <a:r>
-              <a:rPr lang="en-US" sz="2400" dirty="0" smtClean="0"/>
-              <a:t>List Button</a:t>
-            </a:r>
-          </a:p>
-          <a:p>
-            <a:pPr>
-              <a:buFont typeface="Wingdings" pitchFamily="2" charset="2"/>
-              <a:buChar char="q"/>
-            </a:pPr>
-            <a:r>
-              <a:rPr lang="en-US" sz="2400" dirty="0" smtClean="0"/>
-              <a:t>List of items  and shops</a:t>
-            </a:r>
-          </a:p>
-          <a:p>
-            <a:pPr>
-              <a:buFont typeface="Wingdings" pitchFamily="2" charset="2"/>
-              <a:buChar char="q"/>
-            </a:pPr>
-            <a:r>
-              <a:rPr lang="en-US" sz="2400" dirty="0" smtClean="0"/>
-              <a:t>Home screen</a:t>
-            </a:r>
-          </a:p>
-          <a:p>
-            <a:pPr>
-              <a:buFont typeface="Wingdings" pitchFamily="2" charset="2"/>
-              <a:buChar char="q"/>
-            </a:pPr>
-            <a:r>
-              <a:rPr lang="en-US" sz="2400" dirty="0" smtClean="0"/>
-              <a:t>Shop details (database) </a:t>
-            </a:r>
-          </a:p>
-          <a:p>
-            <a:pPr>
-              <a:buFont typeface="Wingdings" pitchFamily="2" charset="2"/>
-              <a:buChar char="q"/>
-            </a:pPr>
-            <a:r>
-              <a:rPr lang="en-US" sz="2400" dirty="0" smtClean="0"/>
+              <a:rPr lang="en-US" sz="2400" dirty="0" smtClean="0">
+                <a:solidFill>
+                  <a:schemeClr val="accent2">
+                    <a:lumMod val="50000"/>
+                  </a:schemeClr>
+                </a:solidFill>
+              </a:rPr>
               <a:t>Map view </a:t>
             </a:r>
           </a:p>
@@ -7380,12 +7390,12 @@
         <p:spPr>
           <a:xfrm>
             <a:off x="609599" y="609600"/>
-            <a:ext cx="8077201" cy="5867400"/>
+            <a:ext cx="8077201" cy="3048000"/>
           </a:xfrm>
         </p:spPr>
         <p:txBody>
           <a:bodyPr>
-            <a:normAutofit/>
+            <a:noAutofit/>
           </a:bodyPr>
           <a:lstStyle/>
           <a:p>
@@ -7398,64 +7408,64 @@
               <a:t>Release Plan: </a:t>
             </a:r>
             <a:r>
-              <a:rPr lang="en-US" sz="2800" dirty="0">
+              <a:rPr lang="en-US" sz="2800" dirty="0" smtClean="0">
                 <a:solidFill>
                   <a:schemeClr val="accent2">
                     <a:lumMod val="50000"/>
                   </a:schemeClr>
                 </a:solidFill>
               </a:rPr>
-              <a:t>Our system can search for any item that is listed by the </a:t>
-            </a:r>
-            <a:r>
-              <a:rPr lang="en-US" sz="2800" dirty="0" smtClean="0">
+              <a:t>Our </a:t>
+            </a:r>
+            <a:r>
+              <a:rPr lang="en-US" sz="2800" dirty="0">
                 <a:solidFill>
                   <a:schemeClr val="accent2">
                     <a:lumMod val="50000"/>
                   </a:schemeClr>
                 </a:solidFill>
               </a:rPr>
-              <a:t>user. It </a:t>
-            </a:r>
-            <a:r>
-              <a:rPr lang="en-US" sz="2800" dirty="0">
+              <a:t>system can search for any item that is listed by the </a:t>
+            </a:r>
+            <a:r>
+              <a:rPr lang="en-US" sz="2800" dirty="0" smtClean="0">
                 <a:solidFill>
                   <a:schemeClr val="accent2">
                     <a:lumMod val="50000"/>
                   </a:schemeClr>
                 </a:solidFill>
               </a:rPr>
-              <a:t>provides the user with the name of the shops and on clicking on any of the shop user is directly directed to the map. From </a:t>
-            </a:r>
-            <a:r>
-              <a:rPr lang="en-US" sz="2800" dirty="0" smtClean="0">
+              <a:t>user. It </a:t>
+            </a:r>
+            <a:r>
+              <a:rPr lang="en-US" sz="2800" dirty="0">
                 <a:solidFill>
                   <a:schemeClr val="accent2">
                     <a:lumMod val="50000"/>
                   </a:schemeClr>
                 </a:solidFill>
               </a:rPr>
-              <a:t>this user </a:t>
-            </a:r>
-            <a:r>
-              <a:rPr lang="en-US" sz="2800" dirty="0">
+              <a:t>provides the user with the name of the shops and on clicking on any of the </a:t>
+            </a:r>
+            <a:r>
+              <a:rPr lang="en-US" sz="2800" dirty="0" smtClean="0">
                 <a:solidFill>
                   <a:schemeClr val="accent2">
                     <a:lumMod val="50000"/>
                   </a:schemeClr>
                 </a:solidFill>
               </a:rPr>
-              <a:t>gets a </a:t>
-            </a:r>
-            <a:r>
-              <a:rPr lang="en-US" sz="2800" dirty="0" smtClean="0">
+              <a:t>shop, user </a:t>
+            </a:r>
+            <a:r>
+              <a:rPr lang="en-US" sz="2800" dirty="0">
                 <a:solidFill>
                   <a:schemeClr val="accent2">
                     <a:lumMod val="50000"/>
                   </a:schemeClr>
                 </a:solidFill>
               </a:rPr>
-              <a:t>clear direction of the chosen shop. </a:t>
+              <a:t>is directly directed to the map. From </a:t>
             </a:r>
             <a:r>
               <a:rPr lang="en-US" sz="2800" dirty="0" smtClean="0">
@@ -7465,7 +7475,37 @@
                   </a:schemeClr>
                 </a:solidFill>
               </a:rPr>
-              <a:t/>
+              <a:t>this user </a:t>
+            </a:r>
+            <a:r>
+              <a:rPr lang="en-US" sz="2800" dirty="0">
+                <a:solidFill>
+                  <a:schemeClr val="accent2">
+                    <a:lumMod val="50000"/>
+                  </a:schemeClr>
+                </a:solidFill>
+              </a:rPr>
+              <a:t>gets a </a:t>
+            </a:r>
+            <a:r>
+              <a:rPr lang="en-US" sz="2800" dirty="0" smtClean="0">
+                <a:solidFill>
+                  <a:schemeClr val="accent2">
+                    <a:lumMod val="50000"/>
+                  </a:schemeClr>
+                </a:solidFill>
+              </a:rPr>
+              <a:t>clear direction of the chosen shop</a:t>
+            </a:r>
+            <a:r>
+              <a:rPr lang="en-US" sz="2800" dirty="0" smtClean="0">
+                <a:solidFill>
+                  <a:schemeClr val="accent2">
+                    <a:lumMod val="50000"/>
+                  </a:schemeClr>
+                </a:solidFill>
+              </a:rPr>
+              <a:t>. Also our 3 main release plans are - </a:t>
             </a:r>
             <a:br>
               <a:rPr lang="en-US" sz="2800" dirty="0" smtClean="0">
@@ -7477,56 +7517,14 @@
               </a:rPr>
             </a:br>
             <a:r>
-              <a:rPr lang="en-US" sz="2800" b="1" dirty="0">
-                <a:solidFill>
-                  <a:schemeClr val="tx1">
-                    <a:lumMod val="95000"/>
-                    <a:lumOff val="5000"/>
-                  </a:schemeClr>
-                </a:solidFill>
-              </a:rPr>
-              <a:t>Future </a:t>
-            </a:r>
-            <a:r>
-              <a:rPr lang="en-US" sz="2800" b="1" dirty="0" smtClean="0">
-                <a:solidFill>
-                  <a:schemeClr val="tx1">
-                    <a:lumMod val="95000"/>
-                    <a:lumOff val="5000"/>
-                  </a:schemeClr>
-                </a:solidFill>
-              </a:rPr>
-              <a:t>works: </a:t>
-            </a:r>
-            <a:r>
-              <a:rPr lang="en-US" sz="2800" dirty="0">
+              <a:rPr lang="en-US" sz="2800" dirty="0" smtClean="0">
                 <a:solidFill>
                   <a:schemeClr val="accent2">
                     <a:lumMod val="50000"/>
                   </a:schemeClr>
                 </a:solidFill>
               </a:rPr>
-              <a:t>We have some more plans with our system. In future we plan to integrate customer feedback system. We also plan to integrate customer </a:t>
-            </a:r>
-            <a:r>
-              <a:rPr lang="en-US" sz="2800" dirty="0" smtClean="0">
-                <a:solidFill>
-                  <a:schemeClr val="accent2">
-                    <a:lumMod val="50000"/>
-                  </a:schemeClr>
-                </a:solidFill>
-              </a:rPr>
-              <a:t>behavior </a:t>
-            </a:r>
-            <a:r>
-              <a:rPr lang="en-US" sz="2800" dirty="0">
-                <a:solidFill>
-                  <a:schemeClr val="accent2">
-                    <a:lumMod val="50000"/>
-                  </a:schemeClr>
-                </a:solidFill>
-              </a:rPr>
-              <a:t>prediction pattern in our system. </a:t>
+              <a:t>   </a:t>
             </a:r>
             <a:endParaRPr lang="en-US" sz="2800" b="1" dirty="0">
               <a:solidFill>
@@ -7535,6 +7533,111 @@
                 </a:schemeClr>
               </a:solidFill>
             </a:endParaRPr>
+          </a:p>
+        </p:txBody>
+      </p:sp>
+      <p:sp>
+        <p:nvSpPr>
+          <p:cNvPr id="3" name="TextBox 2"/>
+          <p:cNvSpPr txBox="1"/>
+          <p:nvPr/>
+        </p:nvSpPr>
+        <p:spPr>
+          <a:xfrm>
+            <a:off x="609600" y="3810000"/>
+            <a:ext cx="7772400" cy="2523768"/>
+          </a:xfrm>
+          <a:prstGeom prst="rect">
+            <a:avLst/>
+          </a:prstGeom>
+          <a:noFill/>
+        </p:spPr>
+        <p:txBody>
+          <a:bodyPr wrap="square" rtlCol="0">
+            <a:spAutoFit/>
+          </a:bodyPr>
+          <a:lstStyle/>
+          <a:p>
+            <a:pPr marL="285750" indent="-285750">
+              <a:buFont typeface="Wingdings" pitchFamily="2" charset="2"/>
+              <a:buChar char="q"/>
+            </a:pPr>
+            <a:r>
+              <a:rPr lang="en-US" sz="2800" dirty="0">
+                <a:solidFill>
+                  <a:schemeClr val="accent2">
+                    <a:lumMod val="50000"/>
+                  </a:schemeClr>
+                </a:solidFill>
+              </a:rPr>
+              <a:t>Android Interface </a:t>
+            </a:r>
+            <a:r>
+              <a:rPr lang="en-US" sz="2800" dirty="0" smtClean="0">
+                <a:solidFill>
+                  <a:schemeClr val="accent2">
+                    <a:lumMod val="50000"/>
+                  </a:schemeClr>
+                </a:solidFill>
+              </a:rPr>
+              <a:t>implementation.</a:t>
+            </a:r>
+          </a:p>
+          <a:p>
+            <a:pPr marL="285750" indent="-285750">
+              <a:buFont typeface="Wingdings" pitchFamily="2" charset="2"/>
+              <a:buChar char="q"/>
+            </a:pPr>
+            <a:r>
+              <a:rPr lang="en-US" sz="2800" dirty="0">
+                <a:solidFill>
+                  <a:schemeClr val="accent2">
+                    <a:lumMod val="50000"/>
+                  </a:schemeClr>
+                </a:solidFill>
+              </a:rPr>
+              <a:t>Create database management system to insert data and retrieve data</a:t>
+            </a:r>
+            <a:r>
+              <a:rPr lang="en-US" sz="2800" dirty="0" smtClean="0">
+                <a:solidFill>
+                  <a:schemeClr val="accent2">
+                    <a:lumMod val="50000"/>
+                  </a:schemeClr>
+                </a:solidFill>
+              </a:rPr>
+              <a:t>.</a:t>
+            </a:r>
+          </a:p>
+          <a:p>
+            <a:pPr marL="285750" indent="-285750">
+              <a:buFont typeface="Wingdings" pitchFamily="2" charset="2"/>
+              <a:buChar char="q"/>
+            </a:pPr>
+            <a:r>
+              <a:rPr lang="en-US" sz="2800" dirty="0">
+                <a:solidFill>
+                  <a:schemeClr val="accent2">
+                    <a:lumMod val="50000"/>
+                  </a:schemeClr>
+                </a:solidFill>
+              </a:rPr>
+              <a:t>Merge Android Application and Database system.</a:t>
+            </a:r>
+            <a:endParaRPr lang="en-US" sz="2800" dirty="0" smtClean="0">
+              <a:solidFill>
+                <a:schemeClr val="accent2">
+                  <a:lumMod val="50000"/>
+                </a:schemeClr>
+              </a:solidFill>
+            </a:endParaRPr>
+          </a:p>
+          <a:p>
+            <a:pPr marL="285750" indent="-285750">
+              <a:buFont typeface="Wingdings" pitchFamily="2" charset="2"/>
+              <a:buChar char="q"/>
+            </a:pPr>
+            <a:endParaRPr lang="en-US" dirty="0"/>
           </a:p>
         </p:txBody>
       </p:sp>
@@ -7552,6 +7655,83 @@
 </file>
 
 <file path=ppt/slides/slide8.xml><?xml version="1.0" encoding="utf-8"?>
+<p:sld xmlns:a="http://schemas.openxmlformats.org/drawingml/2006/main" xmlns:r="http://schemas.openxmlformats.org/officeDocument/2006/relationships" xmlns:p="http://schemas.openxmlformats.org/presentationml/2006/main">
+  <p:cSld>
+    <p:spTree>
+      <p:nvGrpSpPr>
+        <p:cNvPr id="1" name=""/>
+        <p:cNvGrpSpPr/>
+        <p:nvPr/>
+      </p:nvGrpSpPr>
+      <p:grpSpPr>
+        <a:xfrm>
+          <a:off x="0" y="0"/>
+          <a:ext cx="0" cy="0"/>
+          <a:chOff x="0" y="0"/>
+          <a:chExt cx="0" cy="0"/>
+        </a:xfrm>
+      </p:grpSpPr>
+      <p:sp>
+        <p:nvSpPr>
+          <p:cNvPr id="2" name="Title 1"/>
+          <p:cNvSpPr>
+            <a:spLocks noGrp="1"/>
+          </p:cNvSpPr>
+          <p:nvPr>
+            <p:ph type="title"/>
+          </p:nvPr>
+        </p:nvSpPr>
+        <p:spPr>
+          <a:xfrm>
+            <a:off x="609599" y="609600"/>
+            <a:ext cx="6705601" cy="5562600"/>
+          </a:xfrm>
+        </p:spPr>
+        <p:txBody>
+          <a:bodyPr>
+            <a:normAutofit/>
+          </a:bodyPr>
+          <a:lstStyle/>
+          <a:p>
+            <a:r>
+              <a:rPr lang="en-US" b="1" dirty="0">
+                <a:solidFill>
+                  <a:schemeClr val="tx1">
+                    <a:lumMod val="95000"/>
+                    <a:lumOff val="5000"/>
+                  </a:schemeClr>
+                </a:solidFill>
+              </a:rPr>
+              <a:t>Future works: </a:t>
+            </a:r>
+            <a:r>
+              <a:rPr lang="en-US" dirty="0">
+                <a:solidFill>
+                  <a:schemeClr val="accent2">
+                    <a:lumMod val="50000"/>
+                  </a:schemeClr>
+                </a:solidFill>
+              </a:rPr>
+              <a:t>We have some more plans with our system. In future we plan to integrate customer feedback system. We also plan to integrate customer behavior prediction pattern in our system.</a:t>
+            </a:r>
+            <a:endParaRPr lang="en-US" dirty="0"/>
+          </a:p>
+        </p:txBody>
+      </p:sp>
+    </p:spTree>
+    <p:extLst>
+      <p:ext uri="{BB962C8B-B14F-4D97-AF65-F5344CB8AC3E}">
+        <p14:creationId xmlns:p14="http://schemas.microsoft.com/office/powerpoint/2010/main" val="3055227977"/>
+      </p:ext>
+    </p:extLst>
+  </p:cSld>
+  <p:clrMapOvr>
+    <a:masterClrMapping/>
+  </p:clrMapOvr>
+</p:sld>
+</file>
+
+<file path=ppt/slides/slide9.xml><?xml version="1.0" encoding="utf-8"?>
 <p:sld xmlns:a="http://schemas.openxmlformats.org/drawingml/2006/main" xmlns:r="http://schemas.openxmlformats.org/officeDocument/2006/relationships" xmlns:p="http://schemas.openxmlformats.org/presentationml/2006/main">
   <p:cSld>
     <p:spTree>
@@ -7879,7 +8059,7 @@
   <a:extraClrSchemeLst/>
   <a:extLst>
     <a:ext uri="{05A4C25C-085E-4340-85A3-A5531E510DB2}">
-      <thm15:themeFamily xmlns:thm15="http://schemas.microsoft.com/office/thememl/2012/main" xmlns="" name="Facet" id="{C0C680CD-088A-49FC-A102-D699147F32B2}" vid="{CFBC31BA-B70F-4F30-BCAA-4F3011E16C4D}"/>
+      <thm15:themeFamily xmlns="" xmlns:thm15="http://schemas.microsoft.com/office/thememl/2012/main" name="Facet" id="{C0C680CD-088A-49FC-A102-D699147F32B2}" vid="{CFBC31BA-B70F-4F30-BCAA-4F3011E16C4D}"/>
     </a:ext>
   </a:extLst>
 </a:theme>

</xml_diff>